<commit_message>
Updates to training pptx files
git-svn-id: https://svn.code.sf.net/p/electricdss/code@1974 d8739450-1e93-4ef4-a0af-c327d92816ff
</commit_message>
<xml_diff>
--- a/trunk/Training/GAPQ2017/PPT/1 Introduction to Distribution Systems.pptx
+++ b/trunk/Training/GAPQ2017/PPT/1 Introduction to Distribution Systems.pptx
@@ -169,37 +169,6 @@
 </p:presentation>
 </file>
 
-<file path=ppt/ink/ink1.xml><?xml version="1.0" encoding="utf-8"?>
-<inkml:ink xmlns:inkml="http://www.w3.org/2003/InkML">
-  <inkml:definitions>
-    <inkml:context xml:id="ctx0">
-      <inkml:inkSource xml:id="inkSrc0">
-        <inkml:traceFormat>
-          <inkml:channel name="X" type="integer" max="9600" units="cm"/>
-          <inkml:channel name="Y" type="integer" max="7200" units="cm"/>
-          <inkml:channel name="F" type="integer" max="1024" units="dev"/>
-          <inkml:channel name="T" type="integer" max="2.14748E9" units="dev"/>
-        </inkml:traceFormat>
-        <inkml:channelProperties>
-          <inkml:channelProperty channel="X" name="resolution" value="369.51501" units="1/cm"/>
-          <inkml:channelProperty channel="Y" name="resolution" value="415.70438" units="1/cm"/>
-          <inkml:channelProperty channel="F" name="resolution" value="0" units="1/dev"/>
-          <inkml:channelProperty channel="T" name="resolution" value="1" units="1/dev"/>
-        </inkml:channelProperties>
-      </inkml:inkSource>
-      <inkml:timestamp xml:id="ts0" timeString="2016-06-27T15:36:12.833"/>
-    </inkml:context>
-    <inkml:brush xml:id="br0">
-      <inkml:brushProperty name="width" value="0.05292" units="cm"/>
-      <inkml:brushProperty name="height" value="0.05292" units="cm"/>
-      <inkml:brushProperty name="color" value="#FF0000"/>
-    </inkml:brush>
-  </inkml:definitions>
-  <inkml:trace contextRef="#ctx0" brushRef="#br0">7030 5926 160 0,'34'-65'75'0,"-3"30"-59"0,3 9-20 0,-12 18-33 16,8-4 28-16,13 5-129 16</inkml:trace>
-  <inkml:trace contextRef="#ctx0" brushRef="#br0" timeOffset="2883.1925">11033 7064 124 0,'0'-16'59'0,"0"5"-47"0,26-1-15 16,-13 8 93-16,4-3-71 16,9-5 5-16,13 1-16 15,21-4-3-15,9-1-4 16,21 1-93-16,27 3 72 0,34-7-136 16</inkml:trace>
-</inkml:ink>
-</file>
-
 <file path=ppt/notesMasters/notesMaster1.xml><?xml version="1.0" encoding="utf-8"?>
 <p:notesMaster xmlns:a="http://schemas.openxmlformats.org/drawingml/2006/main" xmlns:r="http://schemas.openxmlformats.org/officeDocument/2006/relationships" xmlns:p="http://schemas.openxmlformats.org/presentationml/2006/main">
   <p:cSld>
@@ -282,7 +251,7 @@
           <a:p>
             <a:fld id="{21D603EA-85D6-422C-AB10-17A2A7923832}" type="datetimeFigureOut">
               <a:rPr lang="en-US" smtClean="0"/>
-              <a:t>6/14/2017</a:t>
+              <a:t>6/21/2017</a:t>
             </a:fld>
             <a:endParaRPr lang="en-US" dirty="0"/>
           </a:p>
@@ -15016,9 +14985,19 @@
               <a:buChar char="•"/>
             </a:pPr>
             <a:r>
-              <a:rPr lang="en-US" altLang="en-US" dirty="0"/>
+              <a:rPr lang="en-US" altLang="en-US" sz="2400" dirty="0"/>
               <a:t>This explains why most systems are radial</a:t>
             </a:r>
+          </a:p>
+          <a:p>
+            <a:pPr marL="173038" lvl="1" indent="-173038">
+              <a:lnSpc>
+                <a:spcPct val="90000"/>
+              </a:lnSpc>
+              <a:buFontTx/>
+              <a:buChar char="•"/>
+            </a:pPr>
+            <a:endParaRPr lang="en-US" altLang="en-US" sz="2400" dirty="0"/>
           </a:p>
           <a:p>
             <a:pPr>
@@ -15268,7 +15247,7 @@
           <a:graphicData uri="http://schemas.openxmlformats.org/presentationml/2006/ole">
             <mc:AlternateContent xmlns:mc="http://schemas.openxmlformats.org/markup-compatibility/2006">
               <mc:Choice xmlns:v="urn:schemas-microsoft-com:vml" Requires="v">
-                <p:oleObj spid="_x0000_s4135" name="Document" r:id="rId4" imgW="4725000" imgH="3242160" progId="Word.Document.8">
+                <p:oleObj spid="_x0000_s4136" name="Document" r:id="rId4" imgW="4725000" imgH="3242160" progId="Word.Document.8">
                   <p:embed/>
                 </p:oleObj>
               </mc:Choice>
@@ -17590,7 +17569,7 @@
           <a:p>
             <a:r>
               <a:rPr lang="en-US" dirty="0"/>
-              <a:t>Smart, or “Integrated”, Grid with multiple sources in changing that</a:t>
+              <a:t>Smart, or “Integrated”, Grid with multiple sources is changing that</a:t>
             </a:r>
           </a:p>
           <a:p>
@@ -17960,59 +17939,6 @@
       </p:grpSpPr>
       <p:sp>
         <p:nvSpPr>
-          <p:cNvPr id="194562" name="Rectangle 2"/>
-          <p:cNvSpPr>
-            <a:spLocks noChangeArrowheads="1"/>
-          </p:cNvSpPr>
-          <p:nvPr/>
-        </p:nvSpPr>
-        <p:spPr bwMode="auto">
-          <a:xfrm>
-            <a:off x="1219200" y="1600200"/>
-            <a:ext cx="6915150" cy="4133850"/>
-          </a:xfrm>
-          <a:prstGeom prst="rect">
-            <a:avLst/>
-          </a:prstGeom>
-          <a:solidFill>
-            <a:srgbClr val="FFFFCC"/>
-          </a:solidFill>
-          <a:ln>
-            <a:noFill/>
-          </a:ln>
-          <a:effectLst/>
-          <a:extLst>
-            <a:ext uri="{91240B29-F687-4F45-9708-019B960494DF}">
-              <a14:hiddenLine xmlns:a14="http://schemas.microsoft.com/office/drawing/2010/main" w="57150">
-                <a:solidFill>
-                  <a:srgbClr val="FF5050"/>
-                </a:solidFill>
-                <a:miter lim="800000"/>
-                <a:headEnd/>
-                <a:tailEnd/>
-              </a14:hiddenLine>
-            </a:ext>
-            <a:ext uri="{AF507438-7753-43E0-B8FC-AC1667EBCBE1}">
-              <a14:hiddenEffects xmlns:a14="http://schemas.microsoft.com/office/drawing/2010/main">
-                <a:effectLst>
-                  <a:outerShdw dist="35921" dir="2700000" algn="ctr" rotWithShape="0">
-                    <a:schemeClr val="bg2"/>
-                  </a:outerShdw>
-                </a:effectLst>
-              </a14:hiddenEffects>
-            </a:ext>
-          </a:extLst>
-        </p:spPr>
-        <p:txBody>
-          <a:bodyPr wrap="none" anchor="ctr"/>
-          <a:lstStyle/>
-          <a:p>
-            <a:endParaRPr lang="en-US"/>
-          </a:p>
-        </p:txBody>
-      </p:sp>
-      <p:sp>
-        <p:nvSpPr>
           <p:cNvPr id="194563" name="Rectangle 3"/>
           <p:cNvSpPr>
             <a:spLocks noGrp="1" noChangeArrowheads="1"/>
@@ -18218,6 +18144,10 @@
             </a:r>
           </a:p>
           <a:p>
+            <a:pPr lvl="1"/>
+            <a:endParaRPr lang="en-US" altLang="en-US" dirty="0"/>
+          </a:p>
+          <a:p>
             <a:r>
               <a:rPr lang="en-US" altLang="en-US" dirty="0"/>
               <a:t>Network protectors open very quickly on reverse power</a:t>
@@ -18414,7 +18344,7 @@
             <a:pPr lvl="1"/>
             <a:r>
               <a:rPr lang="en-US" altLang="en-US" dirty="0"/>
-              <a:t>Interrupt current and allow arc to disperse</a:t>
+              <a:t>Interrupt the current and allow arc to disperse</a:t>
             </a:r>
           </a:p>
           <a:p>
@@ -18436,45 +18366,6 @@
           </a:p>
         </p:txBody>
       </p:sp>
-      <mc:AlternateContent xmlns:mc="http://schemas.openxmlformats.org/markup-compatibility/2006" xmlns:p14="http://schemas.microsoft.com/office/powerpoint/2010/main">
-        <mc:Choice Requires="p14">
-          <p:contentPart p14:bwMode="auto" r:id="rId3">
-            <p14:nvContentPartPr>
-              <p14:cNvPr id="2" name="Ink 1"/>
-              <p14:cNvContentPartPr/>
-              <p14:nvPr/>
-            </p14:nvContentPartPr>
-            <p14:xfrm>
-              <a:off x="2530800" y="2078280"/>
-              <a:ext cx="1660320" cy="465120"/>
-            </p14:xfrm>
-          </p:contentPart>
-        </mc:Choice>
-        <mc:Fallback xmlns="">
-          <p:pic>
-            <p:nvPicPr>
-              <p:cNvPr id="2" name="Ink 1"/>
-              <p:cNvPicPr/>
-              <p:nvPr/>
-            </p:nvPicPr>
-            <p:blipFill>
-              <a:blip r:embed="rId4"/>
-              <a:stretch>
-                <a:fillRect/>
-              </a:stretch>
-            </p:blipFill>
-            <p:spPr>
-              <a:xfrm>
-                <a:off x="2526120" y="2075040"/>
-                <a:ext cx="1668240" cy="472320"/>
-              </a:xfrm>
-              <a:prstGeom prst="rect">
-                <a:avLst/>
-              </a:prstGeom>
-            </p:spPr>
-          </p:pic>
-        </mc:Fallback>
-      </mc:AlternateContent>
     </p:spTree>
     <p:extLst>
       <p:ext uri="{BB962C8B-B14F-4D97-AF65-F5344CB8AC3E}">
@@ -18547,7 +18438,7 @@
           <a:graphicData uri="http://schemas.openxmlformats.org/presentationml/2006/ole">
             <mc:AlternateContent xmlns:mc="http://schemas.openxmlformats.org/markup-compatibility/2006">
               <mc:Choice xmlns:v="urn:schemas-microsoft-com:vml" Requires="v">
-                <p:oleObj spid="_x0000_s5159" name="Document" r:id="rId4" imgW="4582080" imgH="3908160" progId="Word.Document.8">
+                <p:oleObj spid="_x0000_s5160" name="Document" r:id="rId4" imgW="4582080" imgH="3908160" progId="Word.Document.8">
                   <p:embed/>
                 </p:oleObj>
               </mc:Choice>
@@ -19523,7 +19414,7 @@
           <a:graphicData uri="http://schemas.openxmlformats.org/presentationml/2006/ole">
             <mc:AlternateContent xmlns:mc="http://schemas.openxmlformats.org/markup-compatibility/2006">
               <mc:Choice xmlns:v="urn:schemas-microsoft-com:vml" Requires="v">
-                <p:oleObj spid="_x0000_s1063" name="Document" r:id="rId4" imgW="5477400" imgH="1430640" progId="Word.Document.8">
+                <p:oleObj spid="_x0000_s1064" name="Document" r:id="rId4" imgW="5477400" imgH="1430640" progId="Word.Document.8">
                   <p:embed/>
                 </p:oleObj>
               </mc:Choice>
@@ -20219,7 +20110,7 @@
           <a:graphicData uri="http://schemas.openxmlformats.org/presentationml/2006/ole">
             <mc:AlternateContent xmlns:mc="http://schemas.openxmlformats.org/markup-compatibility/2006">
               <mc:Choice xmlns:v="urn:schemas-microsoft-com:vml" Requires="v">
-                <p:oleObj spid="_x0000_s2087" name="Document" r:id="rId4" imgW="5448960" imgH="2586960" progId="Word.Document.8">
+                <p:oleObj spid="_x0000_s2088" name="Document" r:id="rId4" imgW="5448960" imgH="2586960" progId="Word.Document.8">
                   <p:embed/>
                 </p:oleObj>
               </mc:Choice>
@@ -20540,7 +20431,7 @@
           <a:graphicData uri="http://schemas.openxmlformats.org/presentationml/2006/ole">
             <mc:AlternateContent xmlns:mc="http://schemas.openxmlformats.org/markup-compatibility/2006">
               <mc:Choice xmlns:v="urn:schemas-microsoft-com:vml" Requires="v">
-                <p:oleObj spid="_x0000_s3111" name="Document" r:id="rId4" imgW="5258520" imgH="2640960" progId="Word.Document.8">
+                <p:oleObj spid="_x0000_s3112" name="Document" r:id="rId4" imgW="5258520" imgH="2640960" progId="Word.Document.8">
                   <p:embed/>
                 </p:oleObj>
               </mc:Choice>
@@ -27069,6 +26960,15 @@
 </file>
 
 <file path=customXml/item1.xml><?xml version="1.0" encoding="utf-8"?>
+<?mso-contentType ?>
+<FormTemplates xmlns="http://schemas.microsoft.com/sharepoint/v3/contenttype/forms">
+  <Display>DocumentLibraryForm</Display>
+  <Edit>DocumentLibraryForm</Edit>
+  <New>DocumentLibraryForm</New>
+</FormTemplates>
+</file>
+
+<file path=customXml/item2.xml><?xml version="1.0" encoding="utf-8"?>
 <ct:contentTypeSchema xmlns:ct="http://schemas.microsoft.com/office/2006/metadata/contentType" xmlns:ma="http://schemas.microsoft.com/office/2006/metadata/properties/metaAttributes" ct:_="" ma:_="" ma:contentTypeName="Document" ma:contentTypeID="0x010100D67101F030D76349B9BDDCB7E839049A" ma:contentTypeVersion="1" ma:contentTypeDescription="Create a new document." ma:contentTypeScope="" ma:versionID="734fc11b70f2696fea1b768389187637">
   <xsd:schema xmlns:xsd="http://www.w3.org/2001/XMLSchema" xmlns:xs="http://www.w3.org/2001/XMLSchema" xmlns:p="http://schemas.microsoft.com/office/2006/metadata/properties" xmlns:ns2="9d4eb815-23ed-48d9-b0c1-2b9ce0016f4e" targetNamespace="http://schemas.microsoft.com/office/2006/metadata/properties" ma:root="true" ma:fieldsID="2b4a09c436e99444c649b2400fdb07dc" ns2:_="">
     <xsd:import namespace="9d4eb815-23ed-48d9-b0c1-2b9ce0016f4e"/>
@@ -27200,15 +27100,6 @@
 </ct:contentTypeSchema>
 </file>
 
-<file path=customXml/item2.xml><?xml version="1.0" encoding="utf-8"?>
-<?mso-contentType ?>
-<FormTemplates xmlns="http://schemas.microsoft.com/sharepoint/v3/contenttype/forms">
-  <Display>DocumentLibraryForm</Display>
-  <Edit>DocumentLibraryForm</Edit>
-  <New>DocumentLibraryForm</New>
-</FormTemplates>
-</file>
-
 <file path=customXml/item3.xml><?xml version="1.0" encoding="utf-8"?>
 <p:properties xmlns:p="http://schemas.microsoft.com/office/2006/metadata/properties" xmlns:xsi="http://www.w3.org/2001/XMLSchema-instance" xmlns:pc="http://schemas.microsoft.com/office/infopath/2007/PartnerControls">
   <documentManagement>
@@ -27218,6 +27109,14 @@
 </file>
 
 <file path=customXml/itemProps1.xml><?xml version="1.0" encoding="utf-8"?>
+<ds:datastoreItem xmlns:ds="http://schemas.openxmlformats.org/officeDocument/2006/customXml" ds:itemID="{F99B5431-8C26-478B-808F-26BED01B748B}">
+  <ds:schemaRefs>
+    <ds:schemaRef ds:uri="http://schemas.microsoft.com/sharepoint/v3/contenttype/forms"/>
+  </ds:schemaRefs>
+</ds:datastoreItem>
+</file>
+
+<file path=customXml/itemProps2.xml><?xml version="1.0" encoding="utf-8"?>
 <ds:datastoreItem xmlns:ds="http://schemas.openxmlformats.org/officeDocument/2006/customXml" ds:itemID="{04AC8A55-24A3-47CA-BC47-DFAAE86ABF30}">
   <ds:schemaRefs>
     <ds:schemaRef ds:uri="http://schemas.microsoft.com/office/2006/metadata/contentType"/>
@@ -27231,14 +27130,6 @@
     <ds:schemaRef ds:uri="http://purl.org/dc/elements/1.1/"/>
     <ds:schemaRef ds:uri="http://purl.org/dc/terms/"/>
     <ds:schemaRef ds:uri="http://schemas.microsoft.com/internal/obd"/>
-  </ds:schemaRefs>
-</ds:datastoreItem>
-</file>
-
-<file path=customXml/itemProps2.xml><?xml version="1.0" encoding="utf-8"?>
-<ds:datastoreItem xmlns:ds="http://schemas.openxmlformats.org/officeDocument/2006/customXml" ds:itemID="{F99B5431-8C26-478B-808F-26BED01B748B}">
-  <ds:schemaRefs>
-    <ds:schemaRef ds:uri="http://schemas.microsoft.com/sharepoint/v3/contenttype/forms"/>
   </ds:schemaRefs>
 </ds:datastoreItem>
 </file>

</xml_diff>